<commit_message>
Updated till 17th March, 2019
</commit_message>
<xml_diff>
--- a/RDBMS Lab/1711072-Arghyadeep Das-RDBMS-IA1.pptx
+++ b/RDBMS Lab/1711072-Arghyadeep Das-RDBMS-IA1.pptx
@@ -5,7 +5,7 @@
     <p:sldMasterId id="2147483648" r:id="rId1"/>
   </p:sldMasterIdLst>
   <p:notesMasterIdLst>
-    <p:notesMasterId r:id="rId21"/>
+    <p:notesMasterId r:id="rId22"/>
   </p:notesMasterIdLst>
   <p:sldIdLst>
     <p:sldId id="256" r:id="rId2"/>
@@ -24,9 +24,10 @@
     <p:sldId id="272" r:id="rId15"/>
     <p:sldId id="273" r:id="rId16"/>
     <p:sldId id="274" r:id="rId17"/>
-    <p:sldId id="275" r:id="rId18"/>
-    <p:sldId id="276" r:id="rId19"/>
-    <p:sldId id="277" r:id="rId20"/>
+    <p:sldId id="279" r:id="rId18"/>
+    <p:sldId id="275" r:id="rId19"/>
+    <p:sldId id="276" r:id="rId20"/>
+    <p:sldId id="277" r:id="rId21"/>
   </p:sldIdLst>
   <p:sldSz cx="12192000" cy="6858000"/>
   <p:notesSz cx="6858000" cy="9144000"/>
@@ -215,7 +216,7 @@
           <a:p>
             <a:fld id="{0D05149E-6293-4668-98C7-DE09D06FD371}" type="datetimeFigureOut">
               <a:rPr lang="en-US" smtClean="0"/>
-              <a:t>04/03/2019</a:t>
+              <a:t>17/03/2019</a:t>
             </a:fld>
             <a:endParaRPr lang="en-US"/>
           </a:p>
@@ -548,7 +549,7 @@
           <a:p>
             <a:fld id="{DD129FD0-8295-4BB9-AF00-8807D2B48F61}" type="slidenum">
               <a:rPr lang="en-US" smtClean="0"/>
-              <a:t>17</a:t>
+              <a:t>18</a:t>
             </a:fld>
             <a:endParaRPr lang="en-US"/>
           </a:p>
@@ -714,7 +715,7 @@
           <a:p>
             <a:fld id="{CAA36A70-F9AA-4C38-8F62-67C77276A433}" type="datetimeFigureOut">
               <a:rPr lang="en-US" smtClean="0"/>
-              <a:t>04/03/2019</a:t>
+              <a:t>17/03/2019</a:t>
             </a:fld>
             <a:endParaRPr lang="en-US"/>
           </a:p>
@@ -912,7 +913,7 @@
           <a:p>
             <a:fld id="{CAA36A70-F9AA-4C38-8F62-67C77276A433}" type="datetimeFigureOut">
               <a:rPr lang="en-US" smtClean="0"/>
-              <a:t>04/03/2019</a:t>
+              <a:t>17/03/2019</a:t>
             </a:fld>
             <a:endParaRPr lang="en-US"/>
           </a:p>
@@ -1120,7 +1121,7 @@
           <a:p>
             <a:fld id="{CAA36A70-F9AA-4C38-8F62-67C77276A433}" type="datetimeFigureOut">
               <a:rPr lang="en-US" smtClean="0"/>
-              <a:t>04/03/2019</a:t>
+              <a:t>17/03/2019</a:t>
             </a:fld>
             <a:endParaRPr lang="en-US"/>
           </a:p>
@@ -1318,7 +1319,7 @@
           <a:p>
             <a:fld id="{CAA36A70-F9AA-4C38-8F62-67C77276A433}" type="datetimeFigureOut">
               <a:rPr lang="en-US" smtClean="0"/>
-              <a:t>04/03/2019</a:t>
+              <a:t>17/03/2019</a:t>
             </a:fld>
             <a:endParaRPr lang="en-US"/>
           </a:p>
@@ -1593,7 +1594,7 @@
           <a:p>
             <a:fld id="{CAA36A70-F9AA-4C38-8F62-67C77276A433}" type="datetimeFigureOut">
               <a:rPr lang="en-US" smtClean="0"/>
-              <a:t>04/03/2019</a:t>
+              <a:t>17/03/2019</a:t>
             </a:fld>
             <a:endParaRPr lang="en-US"/>
           </a:p>
@@ -1858,7 +1859,7 @@
           <a:p>
             <a:fld id="{CAA36A70-F9AA-4C38-8F62-67C77276A433}" type="datetimeFigureOut">
               <a:rPr lang="en-US" smtClean="0"/>
-              <a:t>04/03/2019</a:t>
+              <a:t>17/03/2019</a:t>
             </a:fld>
             <a:endParaRPr lang="en-US"/>
           </a:p>
@@ -2270,7 +2271,7 @@
           <a:p>
             <a:fld id="{CAA36A70-F9AA-4C38-8F62-67C77276A433}" type="datetimeFigureOut">
               <a:rPr lang="en-US" smtClean="0"/>
-              <a:t>04/03/2019</a:t>
+              <a:t>17/03/2019</a:t>
             </a:fld>
             <a:endParaRPr lang="en-US"/>
           </a:p>
@@ -2411,7 +2412,7 @@
           <a:p>
             <a:fld id="{CAA36A70-F9AA-4C38-8F62-67C77276A433}" type="datetimeFigureOut">
               <a:rPr lang="en-US" smtClean="0"/>
-              <a:t>04/03/2019</a:t>
+              <a:t>17/03/2019</a:t>
             </a:fld>
             <a:endParaRPr lang="en-US"/>
           </a:p>
@@ -2524,7 +2525,7 @@
           <a:p>
             <a:fld id="{CAA36A70-F9AA-4C38-8F62-67C77276A433}" type="datetimeFigureOut">
               <a:rPr lang="en-US" smtClean="0"/>
-              <a:t>04/03/2019</a:t>
+              <a:t>17/03/2019</a:t>
             </a:fld>
             <a:endParaRPr lang="en-US"/>
           </a:p>
@@ -2835,7 +2836,7 @@
           <a:p>
             <a:fld id="{CAA36A70-F9AA-4C38-8F62-67C77276A433}" type="datetimeFigureOut">
               <a:rPr lang="en-US" smtClean="0"/>
-              <a:t>04/03/2019</a:t>
+              <a:t>17/03/2019</a:t>
             </a:fld>
             <a:endParaRPr lang="en-US"/>
           </a:p>
@@ -3123,7 +3124,7 @@
           <a:p>
             <a:fld id="{CAA36A70-F9AA-4C38-8F62-67C77276A433}" type="datetimeFigureOut">
               <a:rPr lang="en-US" smtClean="0"/>
-              <a:t>04/03/2019</a:t>
+              <a:t>17/03/2019</a:t>
             </a:fld>
             <a:endParaRPr lang="en-US"/>
           </a:p>
@@ -3383,7 +3384,7 @@
           <a:p>
             <a:fld id="{CAA36A70-F9AA-4C38-8F62-67C77276A433}" type="datetimeFigureOut">
               <a:rPr lang="en-US" smtClean="0"/>
-              <a:t>04/03/2019</a:t>
+              <a:t>17/03/2019</a:t>
             </a:fld>
             <a:endParaRPr lang="en-US"/>
           </a:p>
@@ -5145,8 +5146,8 @@
           </a:p>
         </p:txBody>
       </p:sp>
-      <mc:AlternateContent xmlns:mc="http://schemas.openxmlformats.org/markup-compatibility/2006">
-        <mc:Choice xmlns:a14="http://schemas.microsoft.com/office/drawing/2010/main" Requires="a14">
+      <mc:AlternateContent xmlns:mc="http://schemas.openxmlformats.org/markup-compatibility/2006" xmlns:a14="http://schemas.microsoft.com/office/drawing/2010/main">
+        <mc:Choice Requires="a14">
           <p:sp>
             <p:nvSpPr>
               <p:cNvPr id="3" name="Content Placeholder 2">
@@ -5870,7 +5871,7 @@
             </p:txBody>
           </p:sp>
         </mc:Choice>
-        <mc:Fallback>
+        <mc:Fallback xmlns="">
           <p:sp>
             <p:nvSpPr>
               <p:cNvPr id="3" name="Content Placeholder 2">
@@ -6010,8 +6011,8 @@
           </a:p>
         </p:txBody>
       </p:sp>
-      <mc:AlternateContent xmlns:mc="http://schemas.openxmlformats.org/markup-compatibility/2006">
-        <mc:Choice xmlns:a14="http://schemas.microsoft.com/office/drawing/2010/main" Requires="a14">
+      <mc:AlternateContent xmlns:mc="http://schemas.openxmlformats.org/markup-compatibility/2006" xmlns:a14="http://schemas.microsoft.com/office/drawing/2010/main">
+        <mc:Choice Requires="a14">
           <p:sp>
             <p:nvSpPr>
               <p:cNvPr id="3" name="Content Placeholder 2">
@@ -6494,7 +6495,7 @@
             </p:txBody>
           </p:sp>
         </mc:Choice>
-        <mc:Fallback>
+        <mc:Fallback xmlns="">
           <p:sp>
             <p:nvSpPr>
               <p:cNvPr id="3" name="Content Placeholder 2">
@@ -8023,10 +8024,6 @@
               </a:rPr>
               <a:t>from records on natural language.</a:t>
             </a:r>
-            <a:endParaRPr lang="en-US" dirty="0">
-              <a:latin typeface="Times New Roman" panose="02020603050405020304" pitchFamily="18" charset="0"/>
-              <a:cs typeface="Times New Roman" panose="02020603050405020304" pitchFamily="18" charset="0"/>
-            </a:endParaRPr>
           </a:p>
         </p:txBody>
       </p:sp>
@@ -8088,6 +8085,237 @@
                 <a:latin typeface="Times New Roman" panose="02020603050405020304" pitchFamily="18" charset="0"/>
                 <a:cs typeface="Times New Roman" panose="02020603050405020304" pitchFamily="18" charset="0"/>
               </a:rPr>
+              <a:t>FUTURE PROSPECTS</a:t>
+            </a:r>
+            <a:endParaRPr lang="en-US" dirty="0">
+              <a:latin typeface="Times New Roman" panose="02020603050405020304" pitchFamily="18" charset="0"/>
+              <a:cs typeface="Times New Roman" panose="02020603050405020304" pitchFamily="18" charset="0"/>
+            </a:endParaRPr>
+          </a:p>
+        </p:txBody>
+      </p:sp>
+      <p:sp>
+        <p:nvSpPr>
+          <p:cNvPr id="3" name="Content Placeholder 2"/>
+          <p:cNvSpPr>
+            <a:spLocks noGrp="1"/>
+          </p:cNvSpPr>
+          <p:nvPr>
+            <p:ph idx="1"/>
+          </p:nvPr>
+        </p:nvSpPr>
+        <p:spPr>
+          <a:xfrm>
+            <a:off x="838200" y="1728640"/>
+            <a:ext cx="10515600" cy="4351338"/>
+          </a:xfrm>
+        </p:spPr>
+        <p:txBody>
+          <a:bodyPr>
+            <a:normAutofit/>
+          </a:bodyPr>
+          <a:lstStyle/>
+          <a:p>
+            <a:r>
+              <a:rPr lang="en-US" dirty="0" smtClean="0">
+                <a:latin typeface="Times New Roman" panose="02020603050405020304" pitchFamily="18" charset="0"/>
+                <a:cs typeface="Times New Roman" panose="02020603050405020304" pitchFamily="18" charset="0"/>
+              </a:rPr>
+              <a:t>The paper deals with handling healthcare data. We are aware of the humungous data that’s generated every second in th</a:t>
+            </a:r>
+            <a:r>
+              <a:rPr lang="en-US" dirty="0" smtClean="0">
+                <a:latin typeface="Times New Roman" panose="02020603050405020304" pitchFamily="18" charset="0"/>
+                <a:cs typeface="Times New Roman" panose="02020603050405020304" pitchFamily="18" charset="0"/>
+              </a:rPr>
+              <a:t>e world. </a:t>
+            </a:r>
+          </a:p>
+          <a:p>
+            <a:r>
+              <a:rPr lang="en-US" dirty="0" smtClean="0">
+                <a:latin typeface="Times New Roman" panose="02020603050405020304" pitchFamily="18" charset="0"/>
+                <a:cs typeface="Times New Roman" panose="02020603050405020304" pitchFamily="18" charset="0"/>
+              </a:rPr>
+              <a:t>The fields of healthcare, data analytics, stock markets, media websites, etc. are gushed with terabytes of dat</a:t>
+            </a:r>
+            <a:r>
+              <a:rPr lang="en-US" dirty="0" smtClean="0">
+                <a:latin typeface="Times New Roman" panose="02020603050405020304" pitchFamily="18" charset="0"/>
+                <a:cs typeface="Times New Roman" panose="02020603050405020304" pitchFamily="18" charset="0"/>
+              </a:rPr>
+              <a:t>a every second.</a:t>
+            </a:r>
+          </a:p>
+          <a:p>
+            <a:r>
+              <a:rPr lang="en-US" dirty="0" smtClean="0">
+                <a:latin typeface="Times New Roman" panose="02020603050405020304" pitchFamily="18" charset="0"/>
+                <a:cs typeface="Times New Roman" panose="02020603050405020304" pitchFamily="18" charset="0"/>
+              </a:rPr>
+              <a:t>The concepts presented in this paper can be applie</a:t>
+            </a:r>
+            <a:r>
+              <a:rPr lang="en-US" dirty="0" smtClean="0">
+                <a:latin typeface="Times New Roman" panose="02020603050405020304" pitchFamily="18" charset="0"/>
+                <a:cs typeface="Times New Roman" panose="02020603050405020304" pitchFamily="18" charset="0"/>
+              </a:rPr>
+              <a:t>d to the enormous data we have in the field of stock markets, satellite imagery, space research, biological research, government data, banking etc. </a:t>
+            </a:r>
+            <a:endParaRPr lang="en-US" dirty="0">
+              <a:latin typeface="Times New Roman" panose="02020603050405020304" pitchFamily="18" charset="0"/>
+              <a:cs typeface="Times New Roman" panose="02020603050405020304" pitchFamily="18" charset="0"/>
+            </a:endParaRPr>
+          </a:p>
+        </p:txBody>
+      </p:sp>
+      <p:pic>
+        <p:nvPicPr>
+          <p:cNvPr id="1026" name="Picture 2" descr="Image result for space research data"/>
+          <p:cNvPicPr>
+            <a:picLocks noChangeAspect="1" noChangeArrowheads="1"/>
+          </p:cNvPicPr>
+          <p:nvPr/>
+        </p:nvPicPr>
+        <p:blipFill>
+          <a:blip r:embed="rId2" cstate="hqprint">
+            <a:extLst>
+              <a:ext uri="{28A0092B-C50C-407E-A947-70E740481C1C}">
+                <a14:useLocalDpi xmlns:a14="http://schemas.microsoft.com/office/drawing/2010/main" val="0"/>
+              </a:ext>
+            </a:extLst>
+          </a:blip>
+          <a:srcRect/>
+          <a:stretch>
+            <a:fillRect/>
+          </a:stretch>
+        </p:blipFill>
+        <p:spPr bwMode="auto">
+          <a:xfrm>
+            <a:off x="838200" y="4904509"/>
+            <a:ext cx="2860964" cy="1725528"/>
+          </a:xfrm>
+          <a:prstGeom prst="rect">
+            <a:avLst/>
+          </a:prstGeom>
+          <a:noFill/>
+          <a:extLst>
+            <a:ext uri="{909E8E84-426E-40DD-AFC4-6F175D3DCCD1}">
+              <a14:hiddenFill xmlns:a14="http://schemas.microsoft.com/office/drawing/2010/main">
+                <a:solidFill>
+                  <a:srgbClr val="FFFFFF"/>
+                </a:solidFill>
+              </a14:hiddenFill>
+            </a:ext>
+          </a:extLst>
+        </p:spPr>
+      </p:pic>
+      <p:pic>
+        <p:nvPicPr>
+          <p:cNvPr id="7" name="Picture 6"/>
+          <p:cNvPicPr>
+            <a:picLocks noChangeAspect="1"/>
+          </p:cNvPicPr>
+          <p:nvPr/>
+        </p:nvPicPr>
+        <p:blipFill>
+          <a:blip r:embed="rId3"/>
+          <a:stretch>
+            <a:fillRect/>
+          </a:stretch>
+        </p:blipFill>
+        <p:spPr>
+          <a:xfrm>
+            <a:off x="4445144" y="4904509"/>
+            <a:ext cx="3038475" cy="1725528"/>
+          </a:xfrm>
+          <a:prstGeom prst="rect">
+            <a:avLst/>
+          </a:prstGeom>
+        </p:spPr>
+      </p:pic>
+      <p:pic>
+        <p:nvPicPr>
+          <p:cNvPr id="8" name="Picture 7"/>
+          <p:cNvPicPr>
+            <a:picLocks noChangeAspect="1"/>
+          </p:cNvPicPr>
+          <p:nvPr/>
+        </p:nvPicPr>
+        <p:blipFill>
+          <a:blip r:embed="rId4"/>
+          <a:stretch>
+            <a:fillRect/>
+          </a:stretch>
+        </p:blipFill>
+        <p:spPr>
+          <a:xfrm>
+            <a:off x="8229600" y="4812608"/>
+            <a:ext cx="3124200" cy="1909330"/>
+          </a:xfrm>
+          <a:prstGeom prst="rect">
+            <a:avLst/>
+          </a:prstGeom>
+        </p:spPr>
+      </p:pic>
+    </p:spTree>
+    <p:extLst>
+      <p:ext uri="{BB962C8B-B14F-4D97-AF65-F5344CB8AC3E}">
+        <p14:creationId xmlns:p14="http://schemas.microsoft.com/office/powerpoint/2010/main" val="1602932379"/>
+      </p:ext>
+    </p:extLst>
+  </p:cSld>
+  <p:clrMapOvr>
+    <a:masterClrMapping/>
+  </p:clrMapOvr>
+  <p:timing>
+    <p:tnLst>
+      <p:par>
+        <p:cTn id="1" dur="indefinite" restart="never" nodeType="tmRoot"/>
+      </p:par>
+    </p:tnLst>
+  </p:timing>
+</p:sld>
+</file>
+
+<file path=ppt/slides/slide18.xml><?xml version="1.0" encoding="utf-8"?>
+<p:sld xmlns:a="http://schemas.openxmlformats.org/drawingml/2006/main" xmlns:r="http://schemas.openxmlformats.org/officeDocument/2006/relationships" xmlns:p="http://schemas.openxmlformats.org/presentationml/2006/main">
+  <p:cSld>
+    <p:spTree>
+      <p:nvGrpSpPr>
+        <p:cNvPr id="1" name=""/>
+        <p:cNvGrpSpPr/>
+        <p:nvPr/>
+      </p:nvGrpSpPr>
+      <p:grpSpPr>
+        <a:xfrm>
+          <a:off x="0" y="0"/>
+          <a:ext cx="0" cy="0"/>
+          <a:chOff x="0" y="0"/>
+          <a:chExt cx="0" cy="0"/>
+        </a:xfrm>
+      </p:grpSpPr>
+      <p:sp>
+        <p:nvSpPr>
+          <p:cNvPr id="2" name="Title 1"/>
+          <p:cNvSpPr>
+            <a:spLocks noGrp="1"/>
+          </p:cNvSpPr>
+          <p:nvPr>
+            <p:ph type="title"/>
+          </p:nvPr>
+        </p:nvSpPr>
+        <p:spPr/>
+        <p:txBody>
+          <a:bodyPr/>
+          <a:lstStyle/>
+          <a:p>
+            <a:pPr algn="ctr"/>
+            <a:r>
+              <a:rPr lang="en-US" dirty="0" smtClean="0">
+                <a:latin typeface="Times New Roman" panose="02020603050405020304" pitchFamily="18" charset="0"/>
+                <a:cs typeface="Times New Roman" panose="02020603050405020304" pitchFamily="18" charset="0"/>
+              </a:rPr>
               <a:t>CONCLUSION</a:t>
             </a:r>
             <a:endParaRPr lang="en-US" dirty="0">
@@ -8453,7 +8681,7 @@
 </p:sld>
 </file>
 
-<file path=ppt/slides/slide18.xml><?xml version="1.0" encoding="utf-8"?>
+<file path=ppt/slides/slide19.xml><?xml version="1.0" encoding="utf-8"?>
 <p:sld xmlns:a="http://schemas.openxmlformats.org/drawingml/2006/main" xmlns:r="http://schemas.openxmlformats.org/officeDocument/2006/relationships" xmlns:p="http://schemas.openxmlformats.org/presentationml/2006/main">
   <p:cSld>
     <p:spTree>
@@ -8790,7 +9018,7 @@
 </p:sld>
 </file>
 
-<file path=ppt/slides/slide19.xml><?xml version="1.0" encoding="utf-8"?>
+<file path=ppt/slides/slide2.xml><?xml version="1.0" encoding="utf-8"?>
 <p:sld xmlns:a="http://schemas.openxmlformats.org/drawingml/2006/main" xmlns:r="http://schemas.openxmlformats.org/officeDocument/2006/relationships" xmlns:p="http://schemas.openxmlformats.org/presentationml/2006/main">
   <p:cSld>
     <p:spTree>
@@ -8824,14 +9052,42 @@
           <a:p>
             <a:pPr algn="ctr"/>
             <a:r>
-              <a:rPr lang="en-US" dirty="0" smtClean="0">
-                <a:latin typeface="Times New Roman" panose="02020603050405020304" pitchFamily="18" charset="0"/>
-                <a:cs typeface="Times New Roman" panose="02020603050405020304" pitchFamily="18" charset="0"/>
-              </a:rPr>
-              <a:t>BIBLIOGRAPHY</a:t>
+              <a:rPr lang="en-US" dirty="0" err="1" smtClean="0">
+                <a:latin typeface="Consolas" panose="020B0609020204030204" pitchFamily="49" charset="0"/>
+                <a:cs typeface="Times New Roman" panose="02020603050405020304" pitchFamily="18" charset="0"/>
+              </a:rPr>
+              <a:t>nosql</a:t>
+            </a:r>
+            <a:r>
+              <a:rPr lang="en-US" dirty="0" smtClean="0">
+                <a:latin typeface="Consolas" panose="020B0609020204030204" pitchFamily="49" charset="0"/>
+                <a:cs typeface="Times New Roman" panose="02020603050405020304" pitchFamily="18" charset="0"/>
+              </a:rPr>
+              <a:t> </a:t>
+            </a:r>
+            <a:r>
+              <a:rPr lang="en-US" dirty="0" err="1" smtClean="0">
+                <a:latin typeface="Consolas" panose="020B0609020204030204" pitchFamily="49" charset="0"/>
+                <a:cs typeface="Times New Roman" panose="02020603050405020304" pitchFamily="18" charset="0"/>
+              </a:rPr>
+              <a:t>maketable</a:t>
+            </a:r>
+            <a:r>
+              <a:rPr lang="en-US" dirty="0" smtClean="0">
+                <a:latin typeface="Consolas" panose="020B0609020204030204" pitchFamily="49" charset="0"/>
+                <a:cs typeface="Times New Roman" panose="02020603050405020304" pitchFamily="18" charset="0"/>
+              </a:rPr>
+              <a:t> &lt; </a:t>
+            </a:r>
+            <a:r>
+              <a:rPr lang="en-US" dirty="0" err="1" smtClean="0">
+                <a:latin typeface="Consolas" panose="020B0609020204030204" pitchFamily="49" charset="0"/>
+                <a:cs typeface="Times New Roman" panose="02020603050405020304" pitchFamily="18" charset="0"/>
+              </a:rPr>
+              <a:t>research.tpl</a:t>
             </a:r>
             <a:endParaRPr lang="en-US" dirty="0">
-              <a:latin typeface="Times New Roman" panose="02020603050405020304" pitchFamily="18" charset="0"/>
+              <a:latin typeface="Consolas" panose="020B0609020204030204" pitchFamily="49" charset="0"/>
               <a:cs typeface="Times New Roman" panose="02020603050405020304" pitchFamily="18" charset="0"/>
             </a:endParaRPr>
           </a:p>
@@ -8847,11 +9103,225 @@
             <p:ph idx="1"/>
           </p:nvPr>
         </p:nvSpPr>
+        <p:spPr>
+          <a:xfrm>
+            <a:off x="692727" y="1524000"/>
+            <a:ext cx="10661073" cy="4765964"/>
+          </a:xfrm>
+        </p:spPr>
+        <p:txBody>
+          <a:bodyPr>
+            <a:normAutofit lnSpcReduction="10000"/>
+          </a:bodyPr>
+          <a:lstStyle/>
+          <a:p>
+            <a:pPr marL="0" indent="0">
+              <a:buNone/>
+            </a:pPr>
+            <a:r>
+              <a:rPr lang="en-US" b="1" dirty="0" smtClean="0">
+                <a:latin typeface="Consolas" panose="020B0609020204030204" pitchFamily="49" charset="0"/>
+              </a:rPr>
+              <a:t>&lt; </a:t>
+            </a:r>
+            <a:r>
+              <a:rPr lang="en-US" b="1" dirty="0" err="1" smtClean="0">
+                <a:latin typeface="Consolas" panose="020B0609020204030204" pitchFamily="49" charset="0"/>
+              </a:rPr>
+              <a:t>stdout</a:t>
+            </a:r>
+            <a:endParaRPr lang="en-US" b="1" dirty="0" smtClean="0">
+              <a:latin typeface="Consolas" panose="020B0609020204030204" pitchFamily="49" charset="0"/>
+            </a:endParaRPr>
+          </a:p>
+          <a:p>
+            <a:pPr>
+              <a:buFont typeface="Consolas" panose="020B0609020204030204" pitchFamily="49" charset="0"/>
+              <a:buChar char="˃"/>
+            </a:pPr>
+            <a:r>
+              <a:rPr lang="en-US" dirty="0" smtClean="0">
+                <a:latin typeface="Consolas" panose="020B0609020204030204" pitchFamily="49" charset="0"/>
+              </a:rPr>
+              <a:t>Abstract</a:t>
+            </a:r>
+          </a:p>
+          <a:p>
+            <a:pPr>
+              <a:buFont typeface="Consolas" panose="020B0609020204030204" pitchFamily="49" charset="0"/>
+              <a:buChar char="˃"/>
+            </a:pPr>
+            <a:r>
+              <a:rPr lang="en-US" dirty="0" smtClean="0">
+                <a:latin typeface="Consolas" panose="020B0609020204030204" pitchFamily="49" charset="0"/>
+              </a:rPr>
+              <a:t>Introduction</a:t>
+            </a:r>
+          </a:p>
+          <a:p>
+            <a:pPr>
+              <a:buFont typeface="Consolas" panose="020B0609020204030204" pitchFamily="49" charset="0"/>
+              <a:buChar char="˃"/>
+            </a:pPr>
+            <a:r>
+              <a:rPr lang="en-US" dirty="0" smtClean="0">
+                <a:latin typeface="Consolas" panose="020B0609020204030204" pitchFamily="49" charset="0"/>
+              </a:rPr>
+              <a:t>Databases for medical data storage</a:t>
+            </a:r>
+          </a:p>
+          <a:p>
+            <a:pPr>
+              <a:buFont typeface="Consolas" panose="020B0609020204030204" pitchFamily="49" charset="0"/>
+              <a:buChar char="˃"/>
+            </a:pPr>
+            <a:r>
+              <a:rPr lang="en-US" dirty="0" smtClean="0">
+                <a:latin typeface="Consolas" panose="020B0609020204030204" pitchFamily="49" charset="0"/>
+              </a:rPr>
+              <a:t>Ontology representation of medical reports in NRDBs</a:t>
+            </a:r>
+          </a:p>
+          <a:p>
+            <a:pPr>
+              <a:buFont typeface="Consolas" panose="020B0609020204030204" pitchFamily="49" charset="0"/>
+              <a:buChar char="˃"/>
+            </a:pPr>
+            <a:r>
+              <a:rPr lang="en-US" dirty="0" smtClean="0">
+                <a:latin typeface="Consolas" panose="020B0609020204030204" pitchFamily="49" charset="0"/>
+              </a:rPr>
+              <a:t>Machine Learning for data mining and knowledge extraction</a:t>
+            </a:r>
+          </a:p>
+          <a:p>
+            <a:pPr>
+              <a:buFont typeface="Consolas" panose="020B0609020204030204" pitchFamily="49" charset="0"/>
+              <a:buChar char="˃"/>
+            </a:pPr>
+            <a:r>
+              <a:rPr lang="en-US" dirty="0" smtClean="0">
+                <a:latin typeface="Consolas" panose="020B0609020204030204" pitchFamily="49" charset="0"/>
+              </a:rPr>
+              <a:t>Practical Realization</a:t>
+            </a:r>
+          </a:p>
+          <a:p>
+            <a:pPr>
+              <a:buFont typeface="Consolas" panose="020B0609020204030204" pitchFamily="49" charset="0"/>
+              <a:buChar char="˃"/>
+            </a:pPr>
+            <a:r>
+              <a:rPr lang="en-US" dirty="0" smtClean="0">
+                <a:latin typeface="Consolas" panose="020B0609020204030204" pitchFamily="49" charset="0"/>
+              </a:rPr>
+              <a:t>Conclusion</a:t>
+            </a:r>
+          </a:p>
+          <a:p>
+            <a:pPr>
+              <a:buFont typeface="Consolas" panose="020B0609020204030204" pitchFamily="49" charset="0"/>
+              <a:buChar char="˃"/>
+            </a:pPr>
+            <a:r>
+              <a:rPr lang="en-US" dirty="0" smtClean="0">
+                <a:latin typeface="Consolas" panose="020B0609020204030204" pitchFamily="49" charset="0"/>
+              </a:rPr>
+              <a:t>Bibliography</a:t>
+            </a:r>
+            <a:endParaRPr lang="en-US" dirty="0">
+              <a:latin typeface="Consolas" panose="020B0609020204030204" pitchFamily="49" charset="0"/>
+            </a:endParaRPr>
+          </a:p>
+        </p:txBody>
+      </p:sp>
+    </p:spTree>
+    <p:extLst>
+      <p:ext uri="{BB962C8B-B14F-4D97-AF65-F5344CB8AC3E}">
+        <p14:creationId xmlns:p14="http://schemas.microsoft.com/office/powerpoint/2010/main" val="941392061"/>
+      </p:ext>
+    </p:extLst>
+  </p:cSld>
+  <p:clrMapOvr>
+    <a:masterClrMapping/>
+  </p:clrMapOvr>
+  <p:timing>
+    <p:tnLst>
+      <p:par>
+        <p:cTn id="1" dur="indefinite" restart="never" nodeType="tmRoot"/>
+      </p:par>
+    </p:tnLst>
+  </p:timing>
+</p:sld>
+</file>
+
+<file path=ppt/slides/slide20.xml><?xml version="1.0" encoding="utf-8"?>
+<p:sld xmlns:a="http://schemas.openxmlformats.org/drawingml/2006/main" xmlns:r="http://schemas.openxmlformats.org/officeDocument/2006/relationships" xmlns:p="http://schemas.openxmlformats.org/presentationml/2006/main">
+  <p:cSld>
+    <p:spTree>
+      <p:nvGrpSpPr>
+        <p:cNvPr id="1" name=""/>
+        <p:cNvGrpSpPr/>
+        <p:nvPr/>
+      </p:nvGrpSpPr>
+      <p:grpSpPr>
+        <a:xfrm>
+          <a:off x="0" y="0"/>
+          <a:ext cx="0" cy="0"/>
+          <a:chOff x="0" y="0"/>
+          <a:chExt cx="0" cy="0"/>
+        </a:xfrm>
+      </p:grpSpPr>
+      <p:sp>
+        <p:nvSpPr>
+          <p:cNvPr id="2" name="Title 1"/>
+          <p:cNvSpPr>
+            <a:spLocks noGrp="1"/>
+          </p:cNvSpPr>
+          <p:nvPr>
+            <p:ph type="title"/>
+          </p:nvPr>
+        </p:nvSpPr>
         <p:spPr/>
         <p:txBody>
           <a:bodyPr/>
           <a:lstStyle/>
           <a:p>
+            <a:pPr algn="ctr"/>
+            <a:r>
+              <a:rPr lang="en-US" dirty="0" smtClean="0">
+                <a:latin typeface="Times New Roman" panose="02020603050405020304" pitchFamily="18" charset="0"/>
+                <a:cs typeface="Times New Roman" panose="02020603050405020304" pitchFamily="18" charset="0"/>
+              </a:rPr>
+              <a:t>BIBLIOGRAPHY</a:t>
+            </a:r>
+            <a:endParaRPr lang="en-US" dirty="0">
+              <a:latin typeface="Times New Roman" panose="02020603050405020304" pitchFamily="18" charset="0"/>
+              <a:cs typeface="Times New Roman" panose="02020603050405020304" pitchFamily="18" charset="0"/>
+            </a:endParaRPr>
+          </a:p>
+        </p:txBody>
+      </p:sp>
+      <p:sp>
+        <p:nvSpPr>
+          <p:cNvPr id="3" name="Content Placeholder 2"/>
+          <p:cNvSpPr>
+            <a:spLocks noGrp="1"/>
+          </p:cNvSpPr>
+          <p:nvPr>
+            <p:ph idx="1"/>
+          </p:nvPr>
+        </p:nvSpPr>
+        <p:spPr>
+          <a:xfrm>
+            <a:off x="838200" y="1590090"/>
+            <a:ext cx="10515600" cy="4351338"/>
+          </a:xfrm>
+        </p:spPr>
+        <p:txBody>
+          <a:bodyPr/>
+          <a:lstStyle/>
+          <a:p>
             <a:r>
               <a:rPr lang="en-US" dirty="0">
                 <a:latin typeface="Times New Roman" panose="02020603050405020304" pitchFamily="18" charset="0"/>
@@ -8933,6 +9403,37 @@
               </a:rPr>
               <a:t>www.couchbase.com/solutions/nosql-for-healthcare</a:t>
             </a:r>
+            <a:endParaRPr lang="en-US" dirty="0" smtClean="0">
+              <a:latin typeface="Times New Roman" panose="02020603050405020304" pitchFamily="18" charset="0"/>
+              <a:cs typeface="Times New Roman" panose="02020603050405020304" pitchFamily="18" charset="0"/>
+            </a:endParaRPr>
+          </a:p>
+          <a:p>
+            <a:r>
+              <a:rPr lang="en-US" dirty="0">
+                <a:latin typeface="Times New Roman" panose="02020603050405020304" pitchFamily="18" charset="0"/>
+                <a:cs typeface="Times New Roman" panose="02020603050405020304" pitchFamily="18" charset="0"/>
+                <a:hlinkClick r:id="rId6"/>
+              </a:rPr>
+              <a:t>https://intellipaat.com/blog/7-big-data-examples-application-of-big-data-in-real-life</a:t>
+            </a:r>
+            <a:r>
+              <a:rPr lang="en-US" dirty="0" smtClean="0">
+                <a:latin typeface="Times New Roman" panose="02020603050405020304" pitchFamily="18" charset="0"/>
+                <a:cs typeface="Times New Roman" panose="02020603050405020304" pitchFamily="18" charset="0"/>
+                <a:hlinkClick r:id="rId6"/>
+              </a:rPr>
+              <a:t>/</a:t>
+            </a:r>
+            <a:endParaRPr lang="en-US" dirty="0" smtClean="0">
+              <a:latin typeface="Times New Roman" panose="02020603050405020304" pitchFamily="18" charset="0"/>
+              <a:cs typeface="Times New Roman" panose="02020603050405020304" pitchFamily="18" charset="0"/>
+            </a:endParaRPr>
+          </a:p>
+          <a:p>
+            <a:pPr marL="0" indent="0">
+              <a:buNone/>
+            </a:pPr>
             <a:endParaRPr lang="en-US" dirty="0" smtClean="0">
               <a:latin typeface="Times New Roman" panose="02020603050405020304" pitchFamily="18" charset="0"/>
               <a:cs typeface="Times New Roman" panose="02020603050405020304" pitchFamily="18" charset="0"/>
@@ -9172,243 +9673,6 @@
     <p:bldLst>
       <p:bldP spid="4" grpId="0"/>
     </p:bldLst>
-  </p:timing>
-</p:sld>
-</file>
-
-<file path=ppt/slides/slide2.xml><?xml version="1.0" encoding="utf-8"?>
-<p:sld xmlns:a="http://schemas.openxmlformats.org/drawingml/2006/main" xmlns:r="http://schemas.openxmlformats.org/officeDocument/2006/relationships" xmlns:p="http://schemas.openxmlformats.org/presentationml/2006/main">
-  <p:cSld>
-    <p:spTree>
-      <p:nvGrpSpPr>
-        <p:cNvPr id="1" name=""/>
-        <p:cNvGrpSpPr/>
-        <p:nvPr/>
-      </p:nvGrpSpPr>
-      <p:grpSpPr>
-        <a:xfrm>
-          <a:off x="0" y="0"/>
-          <a:ext cx="0" cy="0"/>
-          <a:chOff x="0" y="0"/>
-          <a:chExt cx="0" cy="0"/>
-        </a:xfrm>
-      </p:grpSpPr>
-      <p:sp>
-        <p:nvSpPr>
-          <p:cNvPr id="2" name="Title 1"/>
-          <p:cNvSpPr>
-            <a:spLocks noGrp="1"/>
-          </p:cNvSpPr>
-          <p:nvPr>
-            <p:ph type="title"/>
-          </p:nvPr>
-        </p:nvSpPr>
-        <p:spPr/>
-        <p:txBody>
-          <a:bodyPr/>
-          <a:lstStyle/>
-          <a:p>
-            <a:pPr algn="ctr"/>
-            <a:r>
-              <a:rPr lang="en-US" dirty="0" err="1" smtClean="0">
-                <a:latin typeface="Consolas" panose="020B0609020204030204" pitchFamily="49" charset="0"/>
-                <a:cs typeface="Times New Roman" panose="02020603050405020304" pitchFamily="18" charset="0"/>
-              </a:rPr>
-              <a:t>nosql</a:t>
-            </a:r>
-            <a:r>
-              <a:rPr lang="en-US" dirty="0" smtClean="0">
-                <a:latin typeface="Consolas" panose="020B0609020204030204" pitchFamily="49" charset="0"/>
-                <a:cs typeface="Times New Roman" panose="02020603050405020304" pitchFamily="18" charset="0"/>
-              </a:rPr>
-              <a:t> </a:t>
-            </a:r>
-            <a:r>
-              <a:rPr lang="en-US" dirty="0" err="1" smtClean="0">
-                <a:latin typeface="Consolas" panose="020B0609020204030204" pitchFamily="49" charset="0"/>
-                <a:cs typeface="Times New Roman" panose="02020603050405020304" pitchFamily="18" charset="0"/>
-              </a:rPr>
-              <a:t>maketable</a:t>
-            </a:r>
-            <a:r>
-              <a:rPr lang="en-US" dirty="0" smtClean="0">
-                <a:latin typeface="Consolas" panose="020B0609020204030204" pitchFamily="49" charset="0"/>
-                <a:cs typeface="Times New Roman" panose="02020603050405020304" pitchFamily="18" charset="0"/>
-              </a:rPr>
-              <a:t> &lt; </a:t>
-            </a:r>
-            <a:r>
-              <a:rPr lang="en-US" dirty="0" err="1" smtClean="0">
-                <a:latin typeface="Consolas" panose="020B0609020204030204" pitchFamily="49" charset="0"/>
-                <a:cs typeface="Times New Roman" panose="02020603050405020304" pitchFamily="18" charset="0"/>
-              </a:rPr>
-              <a:t>research.tpl</a:t>
-            </a:r>
-            <a:endParaRPr lang="en-US" dirty="0">
-              <a:latin typeface="Consolas" panose="020B0609020204030204" pitchFamily="49" charset="0"/>
-              <a:cs typeface="Times New Roman" panose="02020603050405020304" pitchFamily="18" charset="0"/>
-            </a:endParaRPr>
-          </a:p>
-        </p:txBody>
-      </p:sp>
-      <p:sp>
-        <p:nvSpPr>
-          <p:cNvPr id="3" name="Content Placeholder 2"/>
-          <p:cNvSpPr>
-            <a:spLocks noGrp="1"/>
-          </p:cNvSpPr>
-          <p:nvPr>
-            <p:ph idx="1"/>
-          </p:nvPr>
-        </p:nvSpPr>
-        <p:spPr>
-          <a:xfrm>
-            <a:off x="692727" y="1524000"/>
-            <a:ext cx="10661073" cy="4765964"/>
-          </a:xfrm>
-        </p:spPr>
-        <p:txBody>
-          <a:bodyPr>
-            <a:normAutofit lnSpcReduction="10000"/>
-          </a:bodyPr>
-          <a:lstStyle/>
-          <a:p>
-            <a:pPr marL="0" indent="0">
-              <a:buNone/>
-            </a:pPr>
-            <a:r>
-              <a:rPr lang="en-US" b="1" dirty="0" smtClean="0">
-                <a:latin typeface="Consolas" panose="020B0609020204030204" pitchFamily="49" charset="0"/>
-              </a:rPr>
-              <a:t>&lt; </a:t>
-            </a:r>
-            <a:r>
-              <a:rPr lang="en-US" b="1" dirty="0" err="1" smtClean="0">
-                <a:latin typeface="Consolas" panose="020B0609020204030204" pitchFamily="49" charset="0"/>
-              </a:rPr>
-              <a:t>stdout</a:t>
-            </a:r>
-            <a:endParaRPr lang="en-US" b="1" dirty="0" smtClean="0">
-              <a:latin typeface="Consolas" panose="020B0609020204030204" pitchFamily="49" charset="0"/>
-            </a:endParaRPr>
-          </a:p>
-          <a:p>
-            <a:pPr>
-              <a:buFont typeface="Consolas" panose="020B0609020204030204" pitchFamily="49" charset="0"/>
-              <a:buChar char="˃"/>
-            </a:pPr>
-            <a:r>
-              <a:rPr lang="en-US" dirty="0" smtClean="0">
-                <a:latin typeface="Consolas" panose="020B0609020204030204" pitchFamily="49" charset="0"/>
-              </a:rPr>
-              <a:t>Abstract</a:t>
-            </a:r>
-          </a:p>
-          <a:p>
-            <a:pPr>
-              <a:buFont typeface="Consolas" panose="020B0609020204030204" pitchFamily="49" charset="0"/>
-              <a:buChar char="˃"/>
-            </a:pPr>
-            <a:r>
-              <a:rPr lang="en-US" dirty="0" smtClean="0">
-                <a:latin typeface="Consolas" panose="020B0609020204030204" pitchFamily="49" charset="0"/>
-              </a:rPr>
-              <a:t>Introduction</a:t>
-            </a:r>
-          </a:p>
-          <a:p>
-            <a:pPr>
-              <a:buFont typeface="Consolas" panose="020B0609020204030204" pitchFamily="49" charset="0"/>
-              <a:buChar char="˃"/>
-            </a:pPr>
-            <a:r>
-              <a:rPr lang="en-US" dirty="0" smtClean="0">
-                <a:latin typeface="Consolas" panose="020B0609020204030204" pitchFamily="49" charset="0"/>
-              </a:rPr>
-              <a:t>Databases for medical data storage</a:t>
-            </a:r>
-          </a:p>
-          <a:p>
-            <a:pPr>
-              <a:buFont typeface="Consolas" panose="020B0609020204030204" pitchFamily="49" charset="0"/>
-              <a:buChar char="˃"/>
-            </a:pPr>
-            <a:r>
-              <a:rPr lang="en-US" dirty="0" smtClean="0">
-                <a:latin typeface="Consolas" panose="020B0609020204030204" pitchFamily="49" charset="0"/>
-              </a:rPr>
-              <a:t>Ontology representation of medical reports in NRDBs</a:t>
-            </a:r>
-          </a:p>
-          <a:p>
-            <a:pPr>
-              <a:buFont typeface="Consolas" panose="020B0609020204030204" pitchFamily="49" charset="0"/>
-              <a:buChar char="˃"/>
-            </a:pPr>
-            <a:r>
-              <a:rPr lang="en-US" dirty="0" smtClean="0">
-                <a:latin typeface="Consolas" panose="020B0609020204030204" pitchFamily="49" charset="0"/>
-              </a:rPr>
-              <a:t>Machine Learning for data mining and knowledge extraction</a:t>
-            </a:r>
-          </a:p>
-          <a:p>
-            <a:pPr>
-              <a:buFont typeface="Consolas" panose="020B0609020204030204" pitchFamily="49" charset="0"/>
-              <a:buChar char="˃"/>
-            </a:pPr>
-            <a:r>
-              <a:rPr lang="en-US" dirty="0" smtClean="0">
-                <a:latin typeface="Consolas" panose="020B0609020204030204" pitchFamily="49" charset="0"/>
-              </a:rPr>
-              <a:t>Practical Realization</a:t>
-            </a:r>
-          </a:p>
-          <a:p>
-            <a:pPr>
-              <a:buFont typeface="Consolas" panose="020B0609020204030204" pitchFamily="49" charset="0"/>
-              <a:buChar char="˃"/>
-            </a:pPr>
-            <a:r>
-              <a:rPr lang="en-US" dirty="0" smtClean="0">
-                <a:latin typeface="Consolas" panose="020B0609020204030204" pitchFamily="49" charset="0"/>
-              </a:rPr>
-              <a:t>Conclusion</a:t>
-            </a:r>
-          </a:p>
-          <a:p>
-            <a:pPr>
-              <a:buFont typeface="Consolas" panose="020B0609020204030204" pitchFamily="49" charset="0"/>
-              <a:buChar char="˃"/>
-            </a:pPr>
-            <a:r>
-              <a:rPr lang="en-US" dirty="0" smtClean="0">
-                <a:latin typeface="Consolas" panose="020B0609020204030204" pitchFamily="49" charset="0"/>
-              </a:rPr>
-              <a:t>Bibliography</a:t>
-            </a:r>
-            <a:endParaRPr lang="en-US" dirty="0">
-              <a:latin typeface="Consolas" panose="020B0609020204030204" pitchFamily="49" charset="0"/>
-            </a:endParaRPr>
-          </a:p>
-        </p:txBody>
-      </p:sp>
-    </p:spTree>
-    <p:extLst>
-      <p:ext uri="{BB962C8B-B14F-4D97-AF65-F5344CB8AC3E}">
-        <p14:creationId xmlns:p14="http://schemas.microsoft.com/office/powerpoint/2010/main" val="941392061"/>
-      </p:ext>
-    </p:extLst>
-  </p:cSld>
-  <p:clrMapOvr>
-    <a:masterClrMapping/>
-  </p:clrMapOvr>
-  <p:timing>
-    <p:tnLst>
-      <p:par>
-        <p:cTn id="1" dur="indefinite" restart="never" nodeType="tmRoot"/>
-      </p:par>
-    </p:tnLst>
   </p:timing>
 </p:sld>
 </file>

</xml_diff>

<commit_message>
Updated till 2nd April, 2019
</commit_message>
<xml_diff>
--- a/RDBMS Lab/1711072-Arghyadeep Das-RDBMS-IA1.pptx
+++ b/RDBMS Lab/1711072-Arghyadeep Das-RDBMS-IA1.pptx
@@ -216,7 +216,7 @@
           <a:p>
             <a:fld id="{0D05149E-6293-4668-98C7-DE09D06FD371}" type="datetimeFigureOut">
               <a:rPr lang="en-US" smtClean="0"/>
-              <a:t>17/03/2019</a:t>
+              <a:t>20/03/2019</a:t>
             </a:fld>
             <a:endParaRPr lang="en-US"/>
           </a:p>
@@ -715,7 +715,7 @@
           <a:p>
             <a:fld id="{CAA36A70-F9AA-4C38-8F62-67C77276A433}" type="datetimeFigureOut">
               <a:rPr lang="en-US" smtClean="0"/>
-              <a:t>17/03/2019</a:t>
+              <a:t>20/03/2019</a:t>
             </a:fld>
             <a:endParaRPr lang="en-US"/>
           </a:p>
@@ -913,7 +913,7 @@
           <a:p>
             <a:fld id="{CAA36A70-F9AA-4C38-8F62-67C77276A433}" type="datetimeFigureOut">
               <a:rPr lang="en-US" smtClean="0"/>
-              <a:t>17/03/2019</a:t>
+              <a:t>20/03/2019</a:t>
             </a:fld>
             <a:endParaRPr lang="en-US"/>
           </a:p>
@@ -1121,7 +1121,7 @@
           <a:p>
             <a:fld id="{CAA36A70-F9AA-4C38-8F62-67C77276A433}" type="datetimeFigureOut">
               <a:rPr lang="en-US" smtClean="0"/>
-              <a:t>17/03/2019</a:t>
+              <a:t>20/03/2019</a:t>
             </a:fld>
             <a:endParaRPr lang="en-US"/>
           </a:p>
@@ -1319,7 +1319,7 @@
           <a:p>
             <a:fld id="{CAA36A70-F9AA-4C38-8F62-67C77276A433}" type="datetimeFigureOut">
               <a:rPr lang="en-US" smtClean="0"/>
-              <a:t>17/03/2019</a:t>
+              <a:t>20/03/2019</a:t>
             </a:fld>
             <a:endParaRPr lang="en-US"/>
           </a:p>
@@ -1594,7 +1594,7 @@
           <a:p>
             <a:fld id="{CAA36A70-F9AA-4C38-8F62-67C77276A433}" type="datetimeFigureOut">
               <a:rPr lang="en-US" smtClean="0"/>
-              <a:t>17/03/2019</a:t>
+              <a:t>20/03/2019</a:t>
             </a:fld>
             <a:endParaRPr lang="en-US"/>
           </a:p>
@@ -1859,7 +1859,7 @@
           <a:p>
             <a:fld id="{CAA36A70-F9AA-4C38-8F62-67C77276A433}" type="datetimeFigureOut">
               <a:rPr lang="en-US" smtClean="0"/>
-              <a:t>17/03/2019</a:t>
+              <a:t>20/03/2019</a:t>
             </a:fld>
             <a:endParaRPr lang="en-US"/>
           </a:p>
@@ -2271,7 +2271,7 @@
           <a:p>
             <a:fld id="{CAA36A70-F9AA-4C38-8F62-67C77276A433}" type="datetimeFigureOut">
               <a:rPr lang="en-US" smtClean="0"/>
-              <a:t>17/03/2019</a:t>
+              <a:t>20/03/2019</a:t>
             </a:fld>
             <a:endParaRPr lang="en-US"/>
           </a:p>
@@ -2412,7 +2412,7 @@
           <a:p>
             <a:fld id="{CAA36A70-F9AA-4C38-8F62-67C77276A433}" type="datetimeFigureOut">
               <a:rPr lang="en-US" smtClean="0"/>
-              <a:t>17/03/2019</a:t>
+              <a:t>20/03/2019</a:t>
             </a:fld>
             <a:endParaRPr lang="en-US"/>
           </a:p>
@@ -2525,7 +2525,7 @@
           <a:p>
             <a:fld id="{CAA36A70-F9AA-4C38-8F62-67C77276A433}" type="datetimeFigureOut">
               <a:rPr lang="en-US" smtClean="0"/>
-              <a:t>17/03/2019</a:t>
+              <a:t>20/03/2019</a:t>
             </a:fld>
             <a:endParaRPr lang="en-US"/>
           </a:p>
@@ -2836,7 +2836,7 @@
           <a:p>
             <a:fld id="{CAA36A70-F9AA-4C38-8F62-67C77276A433}" type="datetimeFigureOut">
               <a:rPr lang="en-US" smtClean="0"/>
-              <a:t>17/03/2019</a:t>
+              <a:t>20/03/2019</a:t>
             </a:fld>
             <a:endParaRPr lang="en-US"/>
           </a:p>
@@ -3124,7 +3124,7 @@
           <a:p>
             <a:fld id="{CAA36A70-F9AA-4C38-8F62-67C77276A433}" type="datetimeFigureOut">
               <a:rPr lang="en-US" smtClean="0"/>
-              <a:t>17/03/2019</a:t>
+              <a:t>20/03/2019</a:t>
             </a:fld>
             <a:endParaRPr lang="en-US"/>
           </a:p>
@@ -3384,7 +3384,7 @@
           <a:p>
             <a:fld id="{CAA36A70-F9AA-4C38-8F62-67C77276A433}" type="datetimeFigureOut">
               <a:rPr lang="en-US" smtClean="0"/>
-              <a:t>17/03/2019</a:t>
+              <a:t>20/03/2019</a:t>
             </a:fld>
             <a:endParaRPr lang="en-US"/>
           </a:p>
@@ -8121,46 +8121,25 @@
                 <a:latin typeface="Times New Roman" panose="02020603050405020304" pitchFamily="18" charset="0"/>
                 <a:cs typeface="Times New Roman" panose="02020603050405020304" pitchFamily="18" charset="0"/>
               </a:rPr>
-              <a:t>The paper deals with handling healthcare data. We are aware of the humungous data that’s generated every second in th</a:t>
-            </a:r>
-            <a:r>
-              <a:rPr lang="en-US" dirty="0" smtClean="0">
-                <a:latin typeface="Times New Roman" panose="02020603050405020304" pitchFamily="18" charset="0"/>
-                <a:cs typeface="Times New Roman" panose="02020603050405020304" pitchFamily="18" charset="0"/>
-              </a:rPr>
-              <a:t>e world. </a:t>
-            </a:r>
-          </a:p>
-          <a:p>
-            <a:r>
-              <a:rPr lang="en-US" dirty="0" smtClean="0">
-                <a:latin typeface="Times New Roman" panose="02020603050405020304" pitchFamily="18" charset="0"/>
-                <a:cs typeface="Times New Roman" panose="02020603050405020304" pitchFamily="18" charset="0"/>
-              </a:rPr>
-              <a:t>The fields of healthcare, data analytics, stock markets, media websites, etc. are gushed with terabytes of dat</a:t>
-            </a:r>
-            <a:r>
-              <a:rPr lang="en-US" dirty="0" smtClean="0">
-                <a:latin typeface="Times New Roman" panose="02020603050405020304" pitchFamily="18" charset="0"/>
-                <a:cs typeface="Times New Roman" panose="02020603050405020304" pitchFamily="18" charset="0"/>
-              </a:rPr>
-              <a:t>a every second.</a:t>
-            </a:r>
-          </a:p>
-          <a:p>
-            <a:r>
-              <a:rPr lang="en-US" dirty="0" smtClean="0">
-                <a:latin typeface="Times New Roman" panose="02020603050405020304" pitchFamily="18" charset="0"/>
-                <a:cs typeface="Times New Roman" panose="02020603050405020304" pitchFamily="18" charset="0"/>
-              </a:rPr>
-              <a:t>The concepts presented in this paper can be applie</a:t>
-            </a:r>
-            <a:r>
-              <a:rPr lang="en-US" dirty="0" smtClean="0">
-                <a:latin typeface="Times New Roman" panose="02020603050405020304" pitchFamily="18" charset="0"/>
-                <a:cs typeface="Times New Roman" panose="02020603050405020304" pitchFamily="18" charset="0"/>
-              </a:rPr>
-              <a:t>d to the enormous data we have in the field of stock markets, satellite imagery, space research, biological research, government data, banking etc. </a:t>
+              <a:t>The paper deals with handling healthcare data. We are aware of the humungous data that’s generated every second in the world. </a:t>
+            </a:r>
+          </a:p>
+          <a:p>
+            <a:r>
+              <a:rPr lang="en-US" dirty="0" smtClean="0">
+                <a:latin typeface="Times New Roman" panose="02020603050405020304" pitchFamily="18" charset="0"/>
+                <a:cs typeface="Times New Roman" panose="02020603050405020304" pitchFamily="18" charset="0"/>
+              </a:rPr>
+              <a:t>The fields of healthcare, data analytics, stock markets, media websites, etc. are gushed with terabytes of data every second.</a:t>
+            </a:r>
+          </a:p>
+          <a:p>
+            <a:r>
+              <a:rPr lang="en-US" dirty="0" smtClean="0">
+                <a:latin typeface="Times New Roman" panose="02020603050405020304" pitchFamily="18" charset="0"/>
+                <a:cs typeface="Times New Roman" panose="02020603050405020304" pitchFamily="18" charset="0"/>
+              </a:rPr>
+              <a:t>The concepts presented in this paper can be applied to the enormous data we have in the field of stock markets, satellite imagery, space research, biological research, government data, banking etc. </a:t>
             </a:r>
             <a:endParaRPr lang="en-US" dirty="0">
               <a:latin typeface="Times New Roman" panose="02020603050405020304" pitchFamily="18" charset="0"/>
@@ -9765,7 +9744,35 @@
                 <a:latin typeface="Times New Roman" panose="02020603050405020304" pitchFamily="18" charset="0"/>
                 <a:cs typeface="Times New Roman" panose="02020603050405020304" pitchFamily="18" charset="0"/>
               </a:rPr>
-              <a:t>One of the most important fields of decision  support system development is processing medical data for helping experts to make decision in the case of complex pathologies. In generally, a system for storing data and a decision module is main parts of these systems, what that is the reason why is very important to create systems, which can handle medical and expert information, that can be presented in various types and forms. One of the decision in this case is combining methods of machine learning and NoSQL databases.</a:t>
+              <a:t>One of the most important fields of decision  support system development is processing medical data for helping experts to make decision in the case of complex pathologies. In </a:t>
+            </a:r>
+            <a:r>
+              <a:rPr lang="en-US" dirty="0" smtClean="0">
+                <a:latin typeface="Times New Roman" panose="02020603050405020304" pitchFamily="18" charset="0"/>
+                <a:cs typeface="Times New Roman" panose="02020603050405020304" pitchFamily="18" charset="0"/>
+              </a:rPr>
+              <a:t>general, </a:t>
+            </a:r>
+            <a:r>
+              <a:rPr lang="en-US" dirty="0">
+                <a:latin typeface="Times New Roman" panose="02020603050405020304" pitchFamily="18" charset="0"/>
+                <a:cs typeface="Times New Roman" panose="02020603050405020304" pitchFamily="18" charset="0"/>
+              </a:rPr>
+              <a:t>a system for storing data and a decision module is main parts of these systems, </a:t>
+            </a:r>
+            <a:r>
+              <a:rPr lang="en-US" dirty="0" smtClean="0">
+                <a:latin typeface="Times New Roman" panose="02020603050405020304" pitchFamily="18" charset="0"/>
+                <a:cs typeface="Times New Roman" panose="02020603050405020304" pitchFamily="18" charset="0"/>
+              </a:rPr>
+              <a:t>which </a:t>
+            </a:r>
+            <a:r>
+              <a:rPr lang="en-US" dirty="0">
+                <a:latin typeface="Times New Roman" panose="02020603050405020304" pitchFamily="18" charset="0"/>
+                <a:cs typeface="Times New Roman" panose="02020603050405020304" pitchFamily="18" charset="0"/>
+              </a:rPr>
+              <a:t>is the reason why is very important to create systems, which can handle medical and expert information, that can be presented in various types and forms. One of the decision in this case is combining methods of machine learning and NoSQL databases.</a:t>
             </a:r>
           </a:p>
           <a:p>

</xml_diff>